<commit_message>
More work on the logic slides
</commit_message>
<xml_diff>
--- a/BookCompanions-v2/PM-1-FormalSystemsForPhysics.pptx
+++ b/BookCompanions-v2/PM-1-FormalSystemsForPhysics.pptx
@@ -212,7 +212,7 @@
           <a:p>
             <a:fld id="{E119C704-B8F9-449B-B828-36D786A1FE73}" type="datetimeFigureOut">
               <a:rPr lang="en-US" smtClean="0"/>
-              <a:t>3/12/2024</a:t>
+              <a:t>4/3/2024</a:t>
             </a:fld>
             <a:endParaRPr lang="en-US"/>
           </a:p>
@@ -971,7 +971,7 @@
           <a:p>
             <a:fld id="{E417A1AE-5DAB-4E41-9E51-25C599575BB0}" type="datetime1">
               <a:rPr lang="en-US" smtClean="0"/>
-              <a:t>3/12/2024</a:t>
+              <a:t>4/3/2024</a:t>
             </a:fld>
             <a:endParaRPr lang="en-US"/>
           </a:p>
@@ -1475,7 +1475,7 @@
           <a:p>
             <a:fld id="{17283D80-C2D7-44EB-9453-9205AD76814F}" type="datetime1">
               <a:rPr lang="en-US" smtClean="0"/>
-              <a:t>3/12/2024</a:t>
+              <a:t>4/3/2024</a:t>
             </a:fld>
             <a:endParaRPr lang="en-US"/>
           </a:p>
@@ -1686,7 +1686,7 @@
           <a:p>
             <a:fld id="{ECAB4566-B9D7-4BAE-91BA-A6126A23E47D}" type="datetime1">
               <a:rPr lang="en-US" smtClean="0"/>
-              <a:t>3/12/2024</a:t>
+              <a:t>4/3/2024</a:t>
             </a:fld>
             <a:endParaRPr lang="en-US"/>
           </a:p>
@@ -1915,7 +1915,7 @@
           <a:p>
             <a:fld id="{C0EDE3E1-E2CD-4E00-ABD7-0F88148EC8AA}" type="datetime1">
               <a:rPr lang="en-US" smtClean="0"/>
-              <a:t>3/12/2024</a:t>
+              <a:t>4/3/2024</a:t>
             </a:fld>
             <a:endParaRPr lang="en-US" dirty="0"/>
           </a:p>
@@ -2165,7 +2165,7 @@
           <a:p>
             <a:fld id="{8FB1FD97-B171-4664-9387-6C1400880CCF}" type="datetime1">
               <a:rPr lang="en-US" smtClean="0"/>
-              <a:t>3/12/2024</a:t>
+              <a:t>4/3/2024</a:t>
             </a:fld>
             <a:endParaRPr lang="en-US"/>
           </a:p>
@@ -2433,7 +2433,7 @@
           <a:p>
             <a:fld id="{20AF2BC1-FC8E-441B-854A-73B6F6F43270}" type="datetime1">
               <a:rPr lang="en-US" smtClean="0"/>
-              <a:t>3/12/2024</a:t>
+              <a:t>4/3/2024</a:t>
             </a:fld>
             <a:endParaRPr lang="en-US"/>
           </a:p>
@@ -2848,7 +2848,7 @@
           <a:p>
             <a:fld id="{4406EBD5-FA1A-404A-B962-DC2C3404E693}" type="datetime1">
               <a:rPr lang="en-US" smtClean="0"/>
-              <a:t>3/12/2024</a:t>
+              <a:t>4/3/2024</a:t>
             </a:fld>
             <a:endParaRPr lang="en-US"/>
           </a:p>
@@ -2992,7 +2992,7 @@
           <a:p>
             <a:fld id="{17D4C9B1-38A7-4FCE-A708-FF38E3C03BD9}" type="datetime1">
               <a:rPr lang="en-US" smtClean="0"/>
-              <a:t>3/12/2024</a:t>
+              <a:t>4/3/2024</a:t>
             </a:fld>
             <a:endParaRPr lang="en-US"/>
           </a:p>
@@ -3108,7 +3108,7 @@
           <a:p>
             <a:fld id="{AFB41A25-79A9-4D3C-A8ED-6D7D1BE54EAB}" type="datetime1">
               <a:rPr lang="en-US" smtClean="0"/>
-              <a:t>3/12/2024</a:t>
+              <a:t>4/3/2024</a:t>
             </a:fld>
             <a:endParaRPr lang="en-US" dirty="0"/>
           </a:p>
@@ -3423,7 +3423,7 @@
           <a:p>
             <a:fld id="{CF3A2462-D259-4B58-AEB3-225B8847BD20}" type="datetime1">
               <a:rPr lang="en-US" smtClean="0"/>
-              <a:t>3/12/2024</a:t>
+              <a:t>4/3/2024</a:t>
             </a:fld>
             <a:endParaRPr lang="en-US"/>
           </a:p>
@@ -3714,7 +3714,7 @@
           <a:p>
             <a:fld id="{68A25D2F-E7DD-4EDB-8F30-509996C69CA0}" type="datetime1">
               <a:rPr lang="en-US" smtClean="0"/>
-              <a:t>3/12/2024</a:t>
+              <a:t>4/3/2024</a:t>
             </a:fld>
             <a:endParaRPr lang="en-US"/>
           </a:p>
@@ -3958,7 +3958,7 @@
           <a:p>
             <a:fld id="{390F5C6A-251B-4510-9AD3-59281DC647FA}" type="datetime1">
               <a:rPr lang="en-US" smtClean="0"/>
-              <a:t>3/12/2024</a:t>
+              <a:t>4/3/2024</a:t>
             </a:fld>
             <a:endParaRPr lang="en-US" dirty="0"/>
           </a:p>
@@ -4671,7 +4671,7 @@
           <a:p>
             <a:r>
               <a:rPr lang="en-US" dirty="0"/>
-              <a:t>Constructing a formal system for experimental science</a:t>
+              <a:t>Constructing a formal system for physics</a:t>
             </a:r>
           </a:p>
         </p:txBody>
@@ -4926,7 +4926,7 @@
           <a:p>
             <a:r>
               <a:rPr lang="en-US" sz="2400" dirty="0"/>
-              <a:t>The formal system does not know or care of the syntax or semantics of the statement</a:t>
+              <a:t>The formal system does not know or care about the syntax or semantics of the statement</a:t>
             </a:r>
           </a:p>
         </p:txBody>
@@ -10239,7 +10239,7 @@
                   <a:srgbClr val="C00000"/>
                 </a:solidFill>
               </a:rPr>
-              <a:t>Not necessarily have a test that always finishes in all cases</a:t>
+              <a:t>Don’t necessarily have a test that always finishes in all cases</a:t>
             </a:r>
           </a:p>
         </p:txBody>
@@ -12971,8 +12971,8 @@
             </p:nvSpPr>
             <p:spPr>
               <a:xfrm>
-                <a:off x="1995984" y="1883454"/>
-                <a:ext cx="2704395" cy="369332"/>
+                <a:off x="2779755" y="1883454"/>
+                <a:ext cx="2404633" cy="369332"/>
               </a:xfrm>
               <a:prstGeom prst="rect">
                 <a:avLst/>
@@ -13001,7 +13001,25 @@
                       <a:rPr lang="en-US" b="0" i="1" smtClean="0">
                         <a:latin typeface="Cambria Math" panose="02040503050406030204" pitchFamily="18" charset="0"/>
                       </a:rPr>
-                      <m:t>±0.001</m:t>
+                      <m:t>±</m:t>
+                    </m:r>
+                    <m:r>
+                      <m:rPr>
+                        <m:sty m:val="p"/>
+                      </m:rPr>
+                      <a:rPr lang="en-US" b="0" i="0" smtClean="0">
+                        <a:latin typeface="Cambria Math" panose="02040503050406030204" pitchFamily="18" charset="0"/>
+                      </a:rPr>
+                      <m:t>Δ</m:t>
+                    </m:r>
+                    <m:r>
+                      <m:rPr>
+                        <m:sty m:val="p"/>
+                      </m:rPr>
+                      <a:rPr lang="en-US" b="0" i="1" smtClean="0">
+                        <a:latin typeface="Cambria Math" panose="02040503050406030204" pitchFamily="18" charset="0"/>
+                      </a:rPr>
+                      <m:t>F</m:t>
                     </m:r>
                   </m:oMath>
                 </a14:m>
@@ -13030,8 +13048,8 @@
             </p:nvSpPr>
             <p:spPr>
               <a:xfrm>
-                <a:off x="1995984" y="1883454"/>
-                <a:ext cx="2704395" cy="369332"/>
+                <a:off x="2779755" y="1883454"/>
+                <a:ext cx="2404633" cy="369332"/>
               </a:xfrm>
               <a:prstGeom prst="rect">
                 <a:avLst/>
@@ -13039,7 +13057,7 @@
               <a:blipFill>
                 <a:blip r:embed="rId3"/>
                 <a:stretch>
-                  <a:fillRect l="-1802" t="-9836" r="-1351" b="-24590"/>
+                  <a:fillRect l="-2284" t="-9836" r="-1777" b="-24590"/>
                 </a:stretch>
               </a:blipFill>
             </p:spPr>
@@ -13074,8 +13092,8 @@
             </p:nvSpPr>
             <p:spPr>
               <a:xfrm>
-                <a:off x="5844901" y="1871055"/>
-                <a:ext cx="2838790" cy="369332"/>
+                <a:off x="5999281" y="1871055"/>
+                <a:ext cx="2613536" cy="369332"/>
               </a:xfrm>
               <a:prstGeom prst="rect">
                 <a:avLst/>
@@ -13104,7 +13122,22 @@
                       <a:rPr lang="en-US" b="0" i="1" smtClean="0">
                         <a:latin typeface="Cambria Math" panose="02040503050406030204" pitchFamily="18" charset="0"/>
                       </a:rPr>
-                      <m:t>±0.001</m:t>
+                      <m:t>±</m:t>
+                    </m:r>
+                    <m:r>
+                      <m:rPr>
+                        <m:sty m:val="p"/>
+                      </m:rPr>
+                      <a:rPr lang="en-US" b="0" i="0" smtClean="0">
+                        <a:latin typeface="Cambria Math" panose="02040503050406030204" pitchFamily="18" charset="0"/>
+                      </a:rPr>
+                      <m:t>Δ</m:t>
+                    </m:r>
+                    <m:r>
+                      <a:rPr lang="en-US" b="0" i="1" smtClean="0">
+                        <a:latin typeface="Cambria Math" panose="02040503050406030204" pitchFamily="18" charset="0"/>
+                      </a:rPr>
+                      <m:t>𝑚</m:t>
                     </m:r>
                   </m:oMath>
                 </a14:m>
@@ -13133,8 +13166,8 @@
             </p:nvSpPr>
             <p:spPr>
               <a:xfrm>
-                <a:off x="5844901" y="1871055"/>
-                <a:ext cx="2838790" cy="369332"/>
+                <a:off x="5999281" y="1871055"/>
+                <a:ext cx="2613536" cy="369332"/>
               </a:xfrm>
               <a:prstGeom prst="rect">
                 <a:avLst/>
@@ -13142,7 +13175,7 @@
               <a:blipFill>
                 <a:blip r:embed="rId4"/>
                 <a:stretch>
-                  <a:fillRect l="-1935" t="-9836" r="-1290" b="-24590"/>
+                  <a:fillRect l="-1865" t="-9836" r="-1632" b="-24590"/>
                 </a:stretch>
               </a:blipFill>
             </p:spPr>
@@ -13178,7 +13211,7 @@
             <p:spPr>
               <a:xfrm>
                 <a:off x="7346535" y="424934"/>
-                <a:ext cx="3759171" cy="369332"/>
+                <a:ext cx="3357650" cy="369332"/>
               </a:xfrm>
               <a:prstGeom prst="rect">
                 <a:avLst/>
@@ -13207,7 +13240,22 @@
                       <a:rPr lang="en-US" b="0" i="1" smtClean="0">
                         <a:latin typeface="Cambria Math" panose="02040503050406030204" pitchFamily="18" charset="0"/>
                       </a:rPr>
-                      <m:t>±0.001</m:t>
+                      <m:t>±</m:t>
+                    </m:r>
+                    <m:r>
+                      <m:rPr>
+                        <m:sty m:val="p"/>
+                      </m:rPr>
+                      <a:rPr lang="en-US" b="0" i="0" smtClean="0">
+                        <a:latin typeface="Cambria Math" panose="02040503050406030204" pitchFamily="18" charset="0"/>
+                      </a:rPr>
+                      <m:t>Δ</m:t>
+                    </m:r>
+                    <m:r>
+                      <a:rPr lang="en-US" b="0" i="1" smtClean="0">
+                        <a:latin typeface="Cambria Math" panose="02040503050406030204" pitchFamily="18" charset="0"/>
+                      </a:rPr>
+                      <m:t>𝑎</m:t>
                     </m:r>
                   </m:oMath>
                 </a14:m>
@@ -13245,7 +13293,7 @@
             <p:spPr>
               <a:xfrm>
                 <a:off x="7346535" y="424934"/>
-                <a:ext cx="3759171" cy="369332"/>
+                <a:ext cx="3357650" cy="369332"/>
               </a:xfrm>
               <a:prstGeom prst="rect">
                 <a:avLst/>
@@ -13253,7 +13301,7 @@
               <a:blipFill>
                 <a:blip r:embed="rId5"/>
                 <a:stretch>
-                  <a:fillRect l="-1297" t="-10000" b="-26667"/>
+                  <a:fillRect l="-1452" t="-10000" r="-907" b="-26667"/>
                 </a:stretch>
               </a:blipFill>
             </p:spPr>
@@ -13548,8 +13596,8 @@
             </p:nvSpPr>
             <p:spPr>
               <a:xfrm>
-                <a:off x="1086056" y="2668284"/>
-                <a:ext cx="9894696" cy="1384995"/>
+                <a:off x="1378352" y="2668284"/>
+                <a:ext cx="9310114" cy="1384995"/>
               </a:xfrm>
               <a:prstGeom prst="rect">
                 <a:avLst/>
@@ -13579,7 +13627,22 @@
                       <a:rPr lang="en-US" sz="2800" i="1">
                         <a:latin typeface="Cambria Math" panose="02040503050406030204" pitchFamily="18" charset="0"/>
                       </a:rPr>
-                      <m:t>±0.001</m:t>
+                      <m:t>±</m:t>
+                    </m:r>
+                    <m:r>
+                      <m:rPr>
+                        <m:sty m:val="p"/>
+                      </m:rPr>
+                      <a:rPr lang="en-US" sz="2800" b="0" i="0" smtClean="0">
+                        <a:latin typeface="Cambria Math" panose="02040503050406030204" pitchFamily="18" charset="0"/>
+                      </a:rPr>
+                      <m:t>Δ</m:t>
+                    </m:r>
+                    <m:r>
+                      <a:rPr lang="en-US" sz="2800" b="0" i="1" smtClean="0">
+                        <a:latin typeface="Cambria Math" panose="02040503050406030204" pitchFamily="18" charset="0"/>
+                      </a:rPr>
+                      <m:t>𝑚</m:t>
                     </m:r>
                   </m:oMath>
                 </a14:m>
@@ -13613,7 +13676,22 @@
                       <a:rPr lang="en-US" sz="2800" i="1">
                         <a:latin typeface="Cambria Math" panose="02040503050406030204" pitchFamily="18" charset="0"/>
                       </a:rPr>
-                      <m:t>±0.001</m:t>
+                      <m:t>±</m:t>
+                    </m:r>
+                    <m:r>
+                      <m:rPr>
+                        <m:sty m:val="p"/>
+                      </m:rPr>
+                      <a:rPr lang="en-US" sz="2800" b="0" i="0" smtClean="0">
+                        <a:latin typeface="Cambria Math" panose="02040503050406030204" pitchFamily="18" charset="0"/>
+                      </a:rPr>
+                      <m:t>Δ</m:t>
+                    </m:r>
+                    <m:r>
+                      <a:rPr lang="en-US" sz="2800" b="0" i="1" smtClean="0">
+                        <a:latin typeface="Cambria Math" panose="02040503050406030204" pitchFamily="18" charset="0"/>
+                      </a:rPr>
+                      <m:t>𝑎</m:t>
                     </m:r>
                   </m:oMath>
                 </a14:m>
@@ -13667,7 +13745,22 @@
                       <a:rPr lang="en-US" sz="2800" b="0" i="1" smtClean="0">
                         <a:latin typeface="Cambria Math" panose="02040503050406030204" pitchFamily="18" charset="0"/>
                       </a:rPr>
-                      <m:t>±0.001</m:t>
+                      <m:t>±</m:t>
+                    </m:r>
+                    <m:r>
+                      <m:rPr>
+                        <m:sty m:val="p"/>
+                      </m:rPr>
+                      <a:rPr lang="en-US" sz="2800" b="0" i="0" smtClean="0">
+                        <a:latin typeface="Cambria Math" panose="02040503050406030204" pitchFamily="18" charset="0"/>
+                      </a:rPr>
+                      <m:t>Δ</m:t>
+                    </m:r>
+                    <m:r>
+                      <a:rPr lang="en-US" sz="2800" b="0" i="1" smtClean="0">
+                        <a:latin typeface="Cambria Math" panose="02040503050406030204" pitchFamily="18" charset="0"/>
+                      </a:rPr>
+                      <m:t>𝐹</m:t>
                     </m:r>
                   </m:oMath>
                 </a14:m>
@@ -13696,8 +13789,8 @@
             </p:nvSpPr>
             <p:spPr>
               <a:xfrm>
-                <a:off x="1086056" y="2668284"/>
-                <a:ext cx="9894696" cy="1384995"/>
+                <a:off x="1378352" y="2668284"/>
+                <a:ext cx="9310114" cy="1384995"/>
               </a:xfrm>
               <a:prstGeom prst="rect">
                 <a:avLst/>
@@ -13705,7 +13798,7 @@
               <a:blipFill>
                 <a:blip r:embed="rId7"/>
                 <a:stretch>
-                  <a:fillRect l="-739" t="-4405" r="-801" b="-11894"/>
+                  <a:fillRect t="-4405" b="-11894"/>
                 </a:stretch>
               </a:blipFill>
             </p:spPr>
@@ -13947,7 +14040,7 @@
           <a:p>
             <a:r>
               <a:rPr lang="en-US" sz="2400" dirty="0"/>
-              <a:t>Primitive notions should be specifically chosen to expose and only expose necessary complexity</a:t>
+              <a:t>Primitive notions should be specifically chosen to expose only necessary complexity</a:t>
             </a:r>
           </a:p>
         </p:txBody>
@@ -13982,7 +14075,7 @@
           <a:p>
             <a:r>
               <a:rPr lang="en-US" sz="2400" dirty="0"/>
-              <a:t>Axioms/definitions should be specifically chosen to have straight forward justifications</a:t>
+              <a:t>Axioms/definitions should be specifically chosen to have straightforward justifications</a:t>
             </a:r>
           </a:p>
         </p:txBody>
@@ -19882,7 +19975,7 @@
                   </a:schemeClr>
                 </a:solidFill>
               </a:rPr>
-              <a:t>Choose axioms/primitive notions so that the justification is straight forward </a:t>
+              <a:t>Choose axioms/primitive notions so that the justification is straightforward </a:t>
             </a:r>
           </a:p>
         </p:txBody>
@@ -23853,7 +23946,7 @@
                   </a:schemeClr>
                 </a:solidFill>
               </a:rPr>
-              <a:t>Mathematical concepts are “crispier idealizations” </a:t>
+              <a:t>Mathematical concepts are “crisper idealizations” </a:t>
             </a:r>
           </a:p>
         </p:txBody>
@@ -24266,7 +24359,7 @@
                   </a:schemeClr>
                 </a:solidFill>
               </a:rPr>
-              <a:t>What should be our primitive “informal” notion?</a:t>
+              <a:t>What should our primitive “informal” notion be?</a:t>
             </a:r>
           </a:p>
         </p:txBody>
@@ -24490,7 +24583,7 @@
                 </a14:m>
                 <a:r>
                   <a:rPr lang="en-US" sz="2800" dirty="0"/>
-                  <a:t> either something is true or false</a:t>
+                  <a:t> something is either true or false</a:t>
                 </a:r>
               </a:p>
             </p:txBody>
@@ -25317,7 +25410,7 @@
                 </a:pPr>
                 <a:r>
                   <a:rPr lang="en-US" dirty="0"/>
-                  <a:t>It is immoral to kill one person to save ten (not universal and/or evidence-based)</a:t>
+                  <a:t>It is immoral to kill one person to save ten (not universal and/or evidence based)</a:t>
                 </a:r>
               </a:p>
               <a:p>
@@ -25327,7 +25420,7 @@
                 </a:pPr>
                 <a:r>
                   <a:rPr lang="en-US" dirty="0"/>
-                  <a:t>The number 4 is prime (not evidence-based)</a:t>
+                  <a:t>The number 4 is prime (not evidence based)</a:t>
                 </a:r>
               </a:p>
               <a:p>
@@ -25745,7 +25838,7 @@
         <p:spPr>
           <a:xfrm>
             <a:off x="364385" y="948776"/>
-            <a:ext cx="5354223" cy="369332"/>
+            <a:ext cx="5866093" cy="369332"/>
           </a:xfrm>
           <a:prstGeom prst="rect">
             <a:avLst/>
@@ -25760,7 +25853,7 @@
           <a:p>
             <a:r>
               <a:rPr lang="en-US" dirty="0"/>
-              <a:t>Tempting to capture everything into the formal system:</a:t>
+              <a:t>Tempting to try to capture everything into the formal system:</a:t>
             </a:r>
           </a:p>
         </p:txBody>

</xml_diff>

<commit_message>
Adding book companion slides
</commit_message>
<xml_diff>
--- a/BookCompanions-v2/PM-1-FormalSystemsForPhysics.pptx
+++ b/BookCompanions-v2/PM-1-FormalSystemsForPhysics.pptx
@@ -212,7 +212,7 @@
           <a:p>
             <a:fld id="{E119C704-B8F9-449B-B828-36D786A1FE73}" type="datetimeFigureOut">
               <a:rPr lang="en-US" smtClean="0"/>
-              <a:t>4/3/2024</a:t>
+              <a:t>7/15/2024</a:t>
             </a:fld>
             <a:endParaRPr lang="en-US"/>
           </a:p>
@@ -971,7 +971,7 @@
           <a:p>
             <a:fld id="{E417A1AE-5DAB-4E41-9E51-25C599575BB0}" type="datetime1">
               <a:rPr lang="en-US" smtClean="0"/>
-              <a:t>4/3/2024</a:t>
+              <a:t>7/15/2024</a:t>
             </a:fld>
             <a:endParaRPr lang="en-US"/>
           </a:p>
@@ -1475,7 +1475,7 @@
           <a:p>
             <a:fld id="{17283D80-C2D7-44EB-9453-9205AD76814F}" type="datetime1">
               <a:rPr lang="en-US" smtClean="0"/>
-              <a:t>4/3/2024</a:t>
+              <a:t>7/15/2024</a:t>
             </a:fld>
             <a:endParaRPr lang="en-US"/>
           </a:p>
@@ -1686,7 +1686,7 @@
           <a:p>
             <a:fld id="{ECAB4566-B9D7-4BAE-91BA-A6126A23E47D}" type="datetime1">
               <a:rPr lang="en-US" smtClean="0"/>
-              <a:t>4/3/2024</a:t>
+              <a:t>7/15/2024</a:t>
             </a:fld>
             <a:endParaRPr lang="en-US"/>
           </a:p>
@@ -1915,7 +1915,7 @@
           <a:p>
             <a:fld id="{C0EDE3E1-E2CD-4E00-ABD7-0F88148EC8AA}" type="datetime1">
               <a:rPr lang="en-US" smtClean="0"/>
-              <a:t>4/3/2024</a:t>
+              <a:t>7/15/2024</a:t>
             </a:fld>
             <a:endParaRPr lang="en-US" dirty="0"/>
           </a:p>
@@ -2165,7 +2165,7 @@
           <a:p>
             <a:fld id="{8FB1FD97-B171-4664-9387-6C1400880CCF}" type="datetime1">
               <a:rPr lang="en-US" smtClean="0"/>
-              <a:t>4/3/2024</a:t>
+              <a:t>7/15/2024</a:t>
             </a:fld>
             <a:endParaRPr lang="en-US"/>
           </a:p>
@@ -2433,7 +2433,7 @@
           <a:p>
             <a:fld id="{20AF2BC1-FC8E-441B-854A-73B6F6F43270}" type="datetime1">
               <a:rPr lang="en-US" smtClean="0"/>
-              <a:t>4/3/2024</a:t>
+              <a:t>7/15/2024</a:t>
             </a:fld>
             <a:endParaRPr lang="en-US"/>
           </a:p>
@@ -2848,7 +2848,7 @@
           <a:p>
             <a:fld id="{4406EBD5-FA1A-404A-B962-DC2C3404E693}" type="datetime1">
               <a:rPr lang="en-US" smtClean="0"/>
-              <a:t>4/3/2024</a:t>
+              <a:t>7/15/2024</a:t>
             </a:fld>
             <a:endParaRPr lang="en-US"/>
           </a:p>
@@ -2992,7 +2992,7 @@
           <a:p>
             <a:fld id="{17D4C9B1-38A7-4FCE-A708-FF38E3C03BD9}" type="datetime1">
               <a:rPr lang="en-US" smtClean="0"/>
-              <a:t>4/3/2024</a:t>
+              <a:t>7/15/2024</a:t>
             </a:fld>
             <a:endParaRPr lang="en-US"/>
           </a:p>
@@ -3108,7 +3108,7 @@
           <a:p>
             <a:fld id="{AFB41A25-79A9-4D3C-A8ED-6D7D1BE54EAB}" type="datetime1">
               <a:rPr lang="en-US" smtClean="0"/>
-              <a:t>4/3/2024</a:t>
+              <a:t>7/15/2024</a:t>
             </a:fld>
             <a:endParaRPr lang="en-US" dirty="0"/>
           </a:p>
@@ -3423,7 +3423,7 @@
           <a:p>
             <a:fld id="{CF3A2462-D259-4B58-AEB3-225B8847BD20}" type="datetime1">
               <a:rPr lang="en-US" smtClean="0"/>
-              <a:t>4/3/2024</a:t>
+              <a:t>7/15/2024</a:t>
             </a:fld>
             <a:endParaRPr lang="en-US"/>
           </a:p>
@@ -3714,7 +3714,7 @@
           <a:p>
             <a:fld id="{68A25D2F-E7DD-4EDB-8F30-509996C69CA0}" type="datetime1">
               <a:rPr lang="en-US" smtClean="0"/>
-              <a:t>4/3/2024</a:t>
+              <a:t>7/15/2024</a:t>
             </a:fld>
             <a:endParaRPr lang="en-US"/>
           </a:p>
@@ -3958,7 +3958,7 @@
           <a:p>
             <a:fld id="{390F5C6A-251B-4510-9AD3-59281DC647FA}" type="datetime1">
               <a:rPr lang="en-US" smtClean="0"/>
-              <a:t>4/3/2024</a:t>
+              <a:t>7/15/2024</a:t>
             </a:fld>
             <a:endParaRPr lang="en-US" dirty="0"/>
           </a:p>
@@ -5409,7 +5409,7 @@
         <p:spPr>
           <a:xfrm>
             <a:off x="386102" y="3789264"/>
-            <a:ext cx="3635675" cy="369332"/>
+            <a:ext cx="3681201" cy="369332"/>
           </a:xfrm>
           <a:prstGeom prst="rect">
             <a:avLst/>
@@ -5428,7 +5428,7 @@
             </a:pPr>
             <a:r>
               <a:rPr lang="en-US" dirty="0"/>
-              <a:t>“the mass of the photon is exactly 0”</a:t>
+              <a:t>“The mass of the photon is exactly 0”</a:t>
             </a:r>
           </a:p>
         </p:txBody>
@@ -7997,7 +7997,7 @@
         <p:spPr>
           <a:xfrm>
             <a:off x="386102" y="3789264"/>
-            <a:ext cx="3635675" cy="369332"/>
+            <a:ext cx="3681201" cy="369332"/>
           </a:xfrm>
           <a:prstGeom prst="rect">
             <a:avLst/>
@@ -8016,7 +8016,7 @@
             </a:pPr>
             <a:r>
               <a:rPr lang="en-US" dirty="0"/>
-              <a:t>“the mass of the photon is exactly 0”</a:t>
+              <a:t>“The mass of the photon is exactly 0”</a:t>
             </a:r>
           </a:p>
         </p:txBody>
@@ -14075,7 +14075,7 @@
           <a:p>
             <a:r>
               <a:rPr lang="en-US" sz="2400" dirty="0"/>
-              <a:t>Axioms/definitions should be specifically chosen to have straightforward justifications</a:t>
+              <a:t>Axioms/definitions should be specifically chosen to have straightforward physical justifications</a:t>
             </a:r>
           </a:p>
         </p:txBody>
@@ -26622,7 +26622,7 @@
                   </a:schemeClr>
                 </a:solidFill>
               </a:rPr>
-              <a:t>What is an electron? What is mass? What is a physical object? What is a force? …</a:t>
+              <a:t>What is an electron? What is charge? What is a physical object? What is a force? …</a:t>
             </a:r>
           </a:p>
         </p:txBody>
@@ -26663,7 +26663,7 @@
                   </a:schemeClr>
                 </a:solidFill>
               </a:rPr>
-              <a:t>When is object heavy enough to be “unmovable”? How do we group objects into the same system? How do we divide system and environment?</a:t>
+              <a:t>When is an object heavy enough to be “unmovable”? How do we group objects into the same system? How do we divide system and environment?</a:t>
             </a:r>
           </a:p>
         </p:txBody>

</xml_diff>